<commit_message>
Fix table of contents
</commit_message>
<xml_diff>
--- a/content/be/fine_tuning/fine_tuning.pptx
+++ b/content/be/fine_tuning/fine_tuning.pptx
@@ -320,7 +320,7 @@
           <a:p>
             <a:fld id="{AFF6CA10-77A8-48CF-B8BB-9A6F09EF999A}" type="datetimeFigureOut">
               <a:rPr lang="LID4096" smtClean="0"/>
-              <a:t>01/30/2026</a:t>
+              <a:t>02/04/2026</a:t>
             </a:fld>
             <a:endParaRPr lang="LID4096"/>
           </a:p>
@@ -737,7 +737,7 @@
           <a:p>
             <a:fld id="{83023F2C-B818-4B8C-9AC9-F1F58AFDE7C6}" type="datetime1">
               <a:rPr lang="LID4096" smtClean="0"/>
-              <a:t>01/30/2026</a:t>
+              <a:t>02/04/2026</a:t>
             </a:fld>
             <a:endParaRPr lang="LID4096"/>
           </a:p>
@@ -937,7 +937,7 @@
           <a:p>
             <a:fld id="{75EE8536-8941-4A8C-86FC-1079B35B0344}" type="datetime1">
               <a:rPr lang="LID4096" smtClean="0"/>
-              <a:t>01/30/2026</a:t>
+              <a:t>02/04/2026</a:t>
             </a:fld>
             <a:endParaRPr lang="LID4096"/>
           </a:p>
@@ -1147,7 +1147,7 @@
           <a:p>
             <a:fld id="{E4BC0863-424E-47F8-A54B-EC4DEC67C244}" type="datetime1">
               <a:rPr lang="LID4096" smtClean="0"/>
-              <a:t>01/30/2026</a:t>
+              <a:t>02/04/2026</a:t>
             </a:fld>
             <a:endParaRPr lang="LID4096"/>
           </a:p>
@@ -1417,7 +1417,7 @@
           <a:p>
             <a:fld id="{12D417FB-DB75-4510-8AD7-5416595AADD8}" type="datetime1">
               <a:rPr lang="en-US" smtClean="0"/>
-              <a:t>2026-01-30</a:t>
+              <a:t>2026-02-04</a:t>
             </a:fld>
             <a:endParaRPr lang="en-US"/>
           </a:p>
@@ -2903,7 +2903,7 @@
           <a:p>
             <a:fld id="{3FCCD84F-F300-485B-A204-781A035BF124}" type="datetime1">
               <a:rPr lang="LID4096" smtClean="0"/>
-              <a:t>01/30/2026</a:t>
+              <a:t>02/04/2026</a:t>
             </a:fld>
             <a:endParaRPr lang="LID4096"/>
           </a:p>
@@ -5057,7 +5057,7 @@
           <a:p>
             <a:fld id="{3F2499A6-9F54-4C9F-A94C-BFA7D4FBB21B}" type="datetime1">
               <a:rPr lang="LID4096" smtClean="0"/>
-              <a:t>01/30/2026</a:t>
+              <a:t>02/04/2026</a:t>
             </a:fld>
             <a:endParaRPr lang="LID4096"/>
           </a:p>
@@ -5270,7 +5270,7 @@
           <a:p>
             <a:fld id="{EC448E59-F64F-416B-85C7-F58EA54BAF31}" type="datetime1">
               <a:rPr lang="nl-BE" smtClean="0"/>
-              <a:t>30/01/2026</a:t>
+              <a:t>4/02/2026</a:t>
             </a:fld>
             <a:endParaRPr lang="nl-BE"/>
           </a:p>
@@ -5516,7 +5516,7 @@
           <a:p>
             <a:fld id="{9ED5C3B5-60AD-4494-9CFA-8B02B158E887}" type="datetime1">
               <a:rPr lang="nl-BE" smtClean="0"/>
-              <a:t>30/01/2026</a:t>
+              <a:t>4/02/2026</a:t>
             </a:fld>
             <a:endParaRPr lang="nl-BE"/>
           </a:p>
@@ -5634,7 +5634,7 @@
           <a:p>
             <a:fld id="{1E4894A8-27B8-4F4D-B345-90FD4A1447E9}" type="datetime1">
               <a:rPr lang="nl-BE" smtClean="0"/>
-              <a:t>30/01/2026</a:t>
+              <a:t>4/02/2026</a:t>
             </a:fld>
             <a:endParaRPr lang="nl-BE"/>
           </a:p>
@@ -5922,7 +5922,7 @@
           <a:p>
             <a:fld id="{44F0EF99-E673-4972-A23A-EB3FD1F7D254}" type="datetime1">
               <a:rPr lang="nl-BE" smtClean="0"/>
-              <a:t>30/01/2026</a:t>
+              <a:t>4/02/2026</a:t>
             </a:fld>
             <a:endParaRPr lang="nl-BE"/>
           </a:p>
@@ -6178,7 +6178,7 @@
           <a:p>
             <a:fld id="{64574D85-C055-49FC-B1C7-71CF589CD3BE}" type="datetime1">
               <a:rPr lang="LID4096" smtClean="0"/>
-              <a:t>01/30/2026</a:t>
+              <a:t>02/04/2026</a:t>
             </a:fld>
             <a:endParaRPr lang="LID4096"/>
           </a:p>
@@ -6593,7 +6593,7 @@
           <a:p>
             <a:fld id="{57F7C621-78E4-474C-B522-F9EAB1322641}" type="datetime1">
               <a:rPr lang="LID4096" smtClean="0"/>
-              <a:t>01/30/2026</a:t>
+              <a:t>02/04/2026</a:t>
             </a:fld>
             <a:endParaRPr lang="LID4096"/>
           </a:p>
@@ -6735,7 +6735,7 @@
           <a:p>
             <a:fld id="{66184A1E-04A4-4E65-A600-394CD1772B64}" type="datetime1">
               <a:rPr lang="LID4096" smtClean="0"/>
-              <a:t>01/30/2026</a:t>
+              <a:t>02/04/2026</a:t>
             </a:fld>
             <a:endParaRPr lang="LID4096"/>
           </a:p>
@@ -6848,7 +6848,7 @@
           <a:p>
             <a:fld id="{446470D2-0C90-42ED-AA66-9B8CBA5C543D}" type="datetime1">
               <a:rPr lang="LID4096" smtClean="0"/>
-              <a:t>01/30/2026</a:t>
+              <a:t>02/04/2026</a:t>
             </a:fld>
             <a:endParaRPr lang="LID4096"/>
           </a:p>
@@ -7161,7 +7161,7 @@
           <a:p>
             <a:fld id="{CDEFDBDB-5E8E-4B83-805E-D72602863BC8}" type="datetime1">
               <a:rPr lang="LID4096" smtClean="0"/>
-              <a:t>01/30/2026</a:t>
+              <a:t>02/04/2026</a:t>
             </a:fld>
             <a:endParaRPr lang="LID4096"/>
           </a:p>
@@ -7450,7 +7450,7 @@
           <a:p>
             <a:fld id="{F3766E00-DB4B-44DD-8B2F-5EA95B528F60}" type="datetime1">
               <a:rPr lang="LID4096" smtClean="0"/>
-              <a:t>01/30/2026</a:t>
+              <a:t>02/04/2026</a:t>
             </a:fld>
             <a:endParaRPr lang="LID4096"/>
           </a:p>
@@ -7693,7 +7693,7 @@
           <a:p>
             <a:fld id="{BA09C617-5B96-4D55-A102-97077179EF1D}" type="datetime1">
               <a:rPr lang="LID4096" smtClean="0"/>
-              <a:t>01/30/2026</a:t>
+              <a:t>02/04/2026</a:t>
             </a:fld>
             <a:endParaRPr lang="LID4096"/>
           </a:p>
@@ -25430,7 +25430,7 @@
         <p:spPr/>
         <p:txBody>
           <a:bodyPr>
-            <a:normAutofit fontScale="92500" lnSpcReduction="20000"/>
+            <a:normAutofit/>
           </a:bodyPr>
           <a:lstStyle/>
           <a:p>
@@ -25442,49 +25442,13 @@
           <a:p>
             <a:r>
               <a:rPr lang="en-US" dirty="0"/>
-              <a:t>Why LLMs locally?</a:t>
-            </a:r>
-          </a:p>
-          <a:p>
-            <a:r>
-              <a:rPr lang="en-US" dirty="0"/>
-              <a:t>What are LLMs?</a:t>
-            </a:r>
-          </a:p>
-          <a:p>
-            <a:r>
-              <a:rPr lang="en-US" dirty="0"/>
-              <a:t>Can I run an LLM on my laptop?</a:t>
-            </a:r>
-          </a:p>
-          <a:p>
-            <a:r>
-              <a:rPr lang="en-US" dirty="0"/>
-              <a:t>How can I use LLMs?</a:t>
-            </a:r>
-          </a:p>
-          <a:p>
-            <a:r>
-              <a:rPr lang="en-US" dirty="0"/>
-              <a:t>Can I chat with my data?</a:t>
+              <a:t>Fine-tuning models</a:t>
             </a:r>
           </a:p>
           <a:p>
             <a:r>
               <a:rPr lang="en-US" dirty="0"/>
               <a:t>Shrink your model: quantization</a:t>
-            </a:r>
-          </a:p>
-          <a:p>
-            <a:r>
-              <a:rPr lang="en-US" dirty="0"/>
-              <a:t>Fine-tuning models</a:t>
-            </a:r>
-          </a:p>
-          <a:p>
-            <a:r>
-              <a:rPr lang="en-US" dirty="0"/>
-              <a:t>Can I start from scratch?</a:t>
             </a:r>
           </a:p>
           <a:p>

</xml_diff>